<commit_message>
Update Caching & Performance in ColdFusion - ACF Summit 2019.pptx
</commit_message>
<xml_diff>
--- a/Caching & Performance in ColdFusion - ACF Summit 2019.pptx
+++ b/Caching & Performance in ColdFusion - ACF Summit 2019.pptx
@@ -5776,6 +5776,65 @@
           </a:p>
         </p:txBody>
       </p:sp>
+      <p:sp>
+        <p:nvSpPr>
+          <p:cNvPr id="4" name="Rectangle 3">
+            <a:extLst>
+              <a:ext uri="{FF2B5EF4-FFF2-40B4-BE49-F238E27FC236}">
+                <a16:creationId xmlns:a16="http://schemas.microsoft.com/office/drawing/2014/main" id="{97564032-2C22-4DE6-B145-F3170A04A8A1}"/>
+              </a:ext>
+            </a:extLst>
+          </p:cNvPr>
+          <p:cNvSpPr/>
+          <p:nvPr/>
+        </p:nvSpPr>
+        <p:spPr>
+          <a:xfrm>
+            <a:off x="5582855" y="5934670"/>
+            <a:ext cx="7473387" cy="923330"/>
+          </a:xfrm>
+          <a:prstGeom prst="rect">
+            <a:avLst/>
+          </a:prstGeom>
+        </p:spPr>
+        <p:txBody>
+          <a:bodyPr wrap="square">
+            <a:spAutoFit/>
+          </a:bodyPr>
+          <a:lstStyle/>
+          <a:p>
+            <a:pPr marL="742950" lvl="1" indent="-285750">
+              <a:buFont typeface="Arial" panose="020B0604020202020204" pitchFamily="34" charset="0"/>
+              <a:buChar char="•"/>
+            </a:pPr>
+            <a:endParaRPr lang="en-US" b="1" dirty="0"/>
+          </a:p>
+          <a:p>
+            <a:pPr marL="285750" indent="-285750">
+              <a:buFont typeface="Arial" panose="020B0604020202020204" pitchFamily="34" charset="0"/>
+              <a:buChar char="•"/>
+            </a:pPr>
+            <a:r>
+              <a:rPr lang="en-US" b="1"/>
+              <a:t>Slides </a:t>
+            </a:r>
+            <a:r>
+              <a:rPr lang="en-US" b="1" dirty="0"/>
+              <a:t>and code available at:</a:t>
+            </a:r>
+            <a:br>
+              <a:rPr lang="en-US" b="1" dirty="0"/>
+            </a:br>
+            <a:r>
+              <a:rPr lang="en-US" b="1" dirty="0">
+                <a:hlinkClick r:id="rId2"/>
+              </a:rPr>
+              <a:t>https://github.com/ddspringle/cfsummit19-preso-assets</a:t>
+            </a:r>
+            <a:endParaRPr lang="en-US" b="1" dirty="0"/>
+          </a:p>
+        </p:txBody>
+      </p:sp>
     </p:spTree>
     <p:extLst>
       <p:ext uri="{BB962C8B-B14F-4D97-AF65-F5344CB8AC3E}">
@@ -9198,8 +9257,61 @@
             </a:pPr>
             <a:endParaRPr lang="en-US" dirty="0"/>
           </a:p>
-        </p:txBody>
-      </p:sp>
+          <a:p>
+            <a:pPr marL="285750" indent="-285750">
+              <a:buFont typeface="Arial" panose="020B0604020202020204" pitchFamily="34" charset="0"/>
+              <a:buChar char="•"/>
+            </a:pPr>
+            <a:endParaRPr lang="en-US" dirty="0"/>
+          </a:p>
+        </p:txBody>
+      </p:sp>
+      <p:pic>
+        <p:nvPicPr>
+          <p:cNvPr id="5" name="Picture 4">
+            <a:extLst>
+              <a:ext uri="{FF2B5EF4-FFF2-40B4-BE49-F238E27FC236}">
+                <a16:creationId xmlns:a16="http://schemas.microsoft.com/office/drawing/2014/main" id="{936DC15E-09B7-4CDD-B460-F33080883D48}"/>
+              </a:ext>
+            </a:extLst>
+          </p:cNvPr>
+          <p:cNvPicPr>
+            <a:picLocks noChangeAspect="1"/>
+          </p:cNvPicPr>
+          <p:nvPr/>
+        </p:nvPicPr>
+        <p:blipFill>
+          <a:blip r:embed="rId4"/>
+          <a:stretch>
+            <a:fillRect/>
+          </a:stretch>
+        </p:blipFill>
+        <p:spPr>
+          <a:xfrm>
+            <a:off x="8185119" y="5283490"/>
+            <a:ext cx="2997200" cy="571500"/>
+          </a:xfrm>
+          <a:prstGeom prst="rect">
+            <a:avLst/>
+          </a:prstGeom>
+          <a:solidFill>
+            <a:srgbClr val="0070C0"/>
+          </a:solidFill>
+          <a:ln w="127000" cap="sq">
+            <a:solidFill>
+              <a:srgbClr val="0070C0"/>
+            </a:solidFill>
+            <a:miter lim="800000"/>
+          </a:ln>
+          <a:effectLst>
+            <a:outerShdw blurRad="254000" dist="190500" dir="2700000" sy="90000" algn="bl" rotWithShape="0">
+              <a:srgbClr val="000000">
+                <a:alpha val="40000"/>
+              </a:srgbClr>
+            </a:outerShdw>
+          </a:effectLst>
+        </p:spPr>
+      </p:pic>
     </p:spTree>
     <p:extLst>
       <p:ext uri="{BB962C8B-B14F-4D97-AF65-F5344CB8AC3E}">
@@ -9323,15 +9435,7 @@
           <a:p>
             <a:r>
               <a:rPr lang="en-US" sz="1600" dirty="0"/>
-              <a:t>The secret </a:t>
-            </a:r>
-            <a:r>
-              <a:rPr lang="en-US" sz="1600"/>
-              <a:t>to quick </a:t>
-            </a:r>
-            <a:r>
-              <a:rPr lang="en-US" sz="1600" dirty="0"/>
-              <a:t>running code is… writing code that executes quickly, and wisely takes advantage of available resources.</a:t>
+              <a:t>The secret to quick running code is… writing code that executes quickly, and wisely takes advantage of available resources.</a:t>
             </a:r>
           </a:p>
         </p:txBody>

</xml_diff>